<commit_message>
Added images for Visualise and fixed path for Import
</commit_message>
<xml_diff>
--- a/images/edit/editor.pptx
+++ b/images/edit/editor.pptx
@@ -4,9 +4,25 @@
   <p:sldMasterIdLst>
     <p:sldMasterId id="2147483648" r:id="rId1"/>
   </p:sldMasterIdLst>
+  <p:notesMasterIdLst>
+    <p:notesMasterId r:id="rId17"/>
+  </p:notesMasterIdLst>
   <p:sldIdLst>
-    <p:sldId id="256" r:id="rId2"/>
-    <p:sldId id="257" r:id="rId3"/>
+    <p:sldId id="270" r:id="rId2"/>
+    <p:sldId id="256" r:id="rId3"/>
+    <p:sldId id="257" r:id="rId4"/>
+    <p:sldId id="263" r:id="rId5"/>
+    <p:sldId id="258" r:id="rId6"/>
+    <p:sldId id="264" r:id="rId7"/>
+    <p:sldId id="259" r:id="rId8"/>
+    <p:sldId id="265" r:id="rId9"/>
+    <p:sldId id="260" r:id="rId10"/>
+    <p:sldId id="266" r:id="rId11"/>
+    <p:sldId id="261" r:id="rId12"/>
+    <p:sldId id="267" r:id="rId13"/>
+    <p:sldId id="262" r:id="rId14"/>
+    <p:sldId id="268" r:id="rId15"/>
+    <p:sldId id="269" r:id="rId16"/>
   </p:sldIdLst>
   <p:sldSz cx="12192000" cy="6858000"/>
   <p:notesSz cx="6858000" cy="9144000"/>
@@ -105,7 +121,445 @@
       </a:defRPr>
     </a:lvl9pPr>
   </p:defaultTextStyle>
+  <p:extLst>
+    <p:ext uri="{EFAFB233-063F-42B5-8137-9DF3F51BA10A}">
+      <p15:sldGuideLst xmlns:p15="http://schemas.microsoft.com/office/powerpoint/2012/main"/>
+    </p:ext>
+  </p:extLst>
 </p:presentation>
+</file>
+
+<file path=ppt/notesMasters/notesMaster1.xml><?xml version="1.0" encoding="utf-8"?>
+<p:notesMaster xmlns:a="http://schemas.openxmlformats.org/drawingml/2006/main" xmlns:r="http://schemas.openxmlformats.org/officeDocument/2006/relationships" xmlns:p="http://schemas.openxmlformats.org/presentationml/2006/main">
+  <p:cSld>
+    <p:bg>
+      <p:bgRef idx="1001">
+        <a:schemeClr val="bg1"/>
+      </p:bgRef>
+    </p:bg>
+    <p:spTree>
+      <p:nvGrpSpPr>
+        <p:cNvPr id="1" name=""/>
+        <p:cNvGrpSpPr/>
+        <p:nvPr/>
+      </p:nvGrpSpPr>
+      <p:grpSpPr>
+        <a:xfrm>
+          <a:off x="0" y="0"/>
+          <a:ext cx="0" cy="0"/>
+          <a:chOff x="0" y="0"/>
+          <a:chExt cx="0" cy="0"/>
+        </a:xfrm>
+      </p:grpSpPr>
+      <p:sp>
+        <p:nvSpPr>
+          <p:cNvPr id="2" name="Header Placeholder 1"/>
+          <p:cNvSpPr>
+            <a:spLocks noGrp="1"/>
+          </p:cNvSpPr>
+          <p:nvPr>
+            <p:ph type="hdr" sz="quarter"/>
+          </p:nvPr>
+        </p:nvSpPr>
+        <p:spPr>
+          <a:xfrm>
+            <a:off x="0" y="0"/>
+            <a:ext cx="2971800" cy="458788"/>
+          </a:xfrm>
+          <a:prstGeom prst="rect">
+            <a:avLst/>
+          </a:prstGeom>
+        </p:spPr>
+        <p:txBody>
+          <a:bodyPr vert="horz" lIns="91440" tIns="45720" rIns="91440" bIns="45720" rtlCol="0"/>
+          <a:lstStyle>
+            <a:lvl1pPr algn="l">
+              <a:defRPr sz="1200"/>
+            </a:lvl1pPr>
+          </a:lstStyle>
+          <a:p>
+            <a:endParaRPr lang="en-GB"/>
+          </a:p>
+        </p:txBody>
+      </p:sp>
+      <p:sp>
+        <p:nvSpPr>
+          <p:cNvPr id="3" name="Date Placeholder 2"/>
+          <p:cNvSpPr>
+            <a:spLocks noGrp="1"/>
+          </p:cNvSpPr>
+          <p:nvPr>
+            <p:ph type="dt" idx="1"/>
+          </p:nvPr>
+        </p:nvSpPr>
+        <p:spPr>
+          <a:xfrm>
+            <a:off x="3884613" y="0"/>
+            <a:ext cx="2971800" cy="458788"/>
+          </a:xfrm>
+          <a:prstGeom prst="rect">
+            <a:avLst/>
+          </a:prstGeom>
+        </p:spPr>
+        <p:txBody>
+          <a:bodyPr vert="horz" lIns="91440" tIns="45720" rIns="91440" bIns="45720" rtlCol="0"/>
+          <a:lstStyle>
+            <a:lvl1pPr algn="r">
+              <a:defRPr sz="1200"/>
+            </a:lvl1pPr>
+          </a:lstStyle>
+          <a:p>
+            <a:fld id="{A993CB23-C081-A14A-9E25-7A1C74BF0A37}" type="datetimeFigureOut">
+              <a:rPr lang="en-GB" smtClean="0"/>
+              <a:t>30/10/2024</a:t>
+            </a:fld>
+            <a:endParaRPr lang="en-GB"/>
+          </a:p>
+        </p:txBody>
+      </p:sp>
+      <p:sp>
+        <p:nvSpPr>
+          <p:cNvPr id="4" name="Slide Image Placeholder 3"/>
+          <p:cNvSpPr>
+            <a:spLocks noGrp="1" noRot="1" noChangeAspect="1"/>
+          </p:cNvSpPr>
+          <p:nvPr>
+            <p:ph type="sldImg" idx="2"/>
+          </p:nvPr>
+        </p:nvSpPr>
+        <p:spPr>
+          <a:xfrm>
+            <a:off x="685800" y="1143000"/>
+            <a:ext cx="5486400" cy="3086100"/>
+          </a:xfrm>
+          <a:prstGeom prst="rect">
+            <a:avLst/>
+          </a:prstGeom>
+          <a:noFill/>
+          <a:ln w="12700">
+            <a:solidFill>
+              <a:prstClr val="black"/>
+            </a:solidFill>
+          </a:ln>
+        </p:spPr>
+        <p:txBody>
+          <a:bodyPr vert="horz" lIns="91440" tIns="45720" rIns="91440" bIns="45720" rtlCol="0" anchor="ctr"/>
+          <a:lstStyle/>
+          <a:p>
+            <a:endParaRPr lang="en-GB"/>
+          </a:p>
+        </p:txBody>
+      </p:sp>
+      <p:sp>
+        <p:nvSpPr>
+          <p:cNvPr id="5" name="Notes Placeholder 4"/>
+          <p:cNvSpPr>
+            <a:spLocks noGrp="1"/>
+          </p:cNvSpPr>
+          <p:nvPr>
+            <p:ph type="body" sz="quarter" idx="3"/>
+          </p:nvPr>
+        </p:nvSpPr>
+        <p:spPr>
+          <a:xfrm>
+            <a:off x="685800" y="4400550"/>
+            <a:ext cx="5486400" cy="3600450"/>
+          </a:xfrm>
+          <a:prstGeom prst="rect">
+            <a:avLst/>
+          </a:prstGeom>
+        </p:spPr>
+        <p:txBody>
+          <a:bodyPr vert="horz" lIns="91440" tIns="45720" rIns="91440" bIns="45720" rtlCol="0"/>
+          <a:lstStyle/>
+          <a:p>
+            <a:pPr lvl="0"/>
+            <a:r>
+              <a:rPr lang="en-GB"/>
+              <a:t>Click to edit Master text styles</a:t>
+            </a:r>
+          </a:p>
+          <a:p>
+            <a:pPr lvl="1"/>
+            <a:r>
+              <a:rPr lang="en-GB"/>
+              <a:t>Second level</a:t>
+            </a:r>
+          </a:p>
+          <a:p>
+            <a:pPr lvl="2"/>
+            <a:r>
+              <a:rPr lang="en-GB"/>
+              <a:t>Third level</a:t>
+            </a:r>
+          </a:p>
+          <a:p>
+            <a:pPr lvl="3"/>
+            <a:r>
+              <a:rPr lang="en-GB"/>
+              <a:t>Fourth level</a:t>
+            </a:r>
+          </a:p>
+          <a:p>
+            <a:pPr lvl="4"/>
+            <a:r>
+              <a:rPr lang="en-GB"/>
+              <a:t>Fifth level</a:t>
+            </a:r>
+          </a:p>
+        </p:txBody>
+      </p:sp>
+      <p:sp>
+        <p:nvSpPr>
+          <p:cNvPr id="6" name="Footer Placeholder 5"/>
+          <p:cNvSpPr>
+            <a:spLocks noGrp="1"/>
+          </p:cNvSpPr>
+          <p:nvPr>
+            <p:ph type="ftr" sz="quarter" idx="4"/>
+          </p:nvPr>
+        </p:nvSpPr>
+        <p:spPr>
+          <a:xfrm>
+            <a:off x="0" y="8685213"/>
+            <a:ext cx="2971800" cy="458787"/>
+          </a:xfrm>
+          <a:prstGeom prst="rect">
+            <a:avLst/>
+          </a:prstGeom>
+        </p:spPr>
+        <p:txBody>
+          <a:bodyPr vert="horz" lIns="91440" tIns="45720" rIns="91440" bIns="45720" rtlCol="0" anchor="b"/>
+          <a:lstStyle>
+            <a:lvl1pPr algn="l">
+              <a:defRPr sz="1200"/>
+            </a:lvl1pPr>
+          </a:lstStyle>
+          <a:p>
+            <a:endParaRPr lang="en-GB"/>
+          </a:p>
+        </p:txBody>
+      </p:sp>
+      <p:sp>
+        <p:nvSpPr>
+          <p:cNvPr id="7" name="Slide Number Placeholder 6"/>
+          <p:cNvSpPr>
+            <a:spLocks noGrp="1"/>
+          </p:cNvSpPr>
+          <p:nvPr>
+            <p:ph type="sldNum" sz="quarter" idx="5"/>
+          </p:nvPr>
+        </p:nvSpPr>
+        <p:spPr>
+          <a:xfrm>
+            <a:off x="3884613" y="8685213"/>
+            <a:ext cx="2971800" cy="458787"/>
+          </a:xfrm>
+          <a:prstGeom prst="rect">
+            <a:avLst/>
+          </a:prstGeom>
+        </p:spPr>
+        <p:txBody>
+          <a:bodyPr vert="horz" lIns="91440" tIns="45720" rIns="91440" bIns="45720" rtlCol="0" anchor="b"/>
+          <a:lstStyle>
+            <a:lvl1pPr algn="r">
+              <a:defRPr sz="1200"/>
+            </a:lvl1pPr>
+          </a:lstStyle>
+          <a:p>
+            <a:fld id="{7F2FAC71-0F1C-504C-A0F9-DE820AC8FBFB}" type="slidenum">
+              <a:rPr lang="en-GB" smtClean="0"/>
+              <a:t>‹#›</a:t>
+            </a:fld>
+            <a:endParaRPr lang="en-GB"/>
+          </a:p>
+        </p:txBody>
+      </p:sp>
+    </p:spTree>
+    <p:extLst>
+      <p:ext uri="{BB962C8B-B14F-4D97-AF65-F5344CB8AC3E}">
+        <p14:creationId xmlns:p14="http://schemas.microsoft.com/office/powerpoint/2010/main" val="1005004672"/>
+      </p:ext>
+    </p:extLst>
+  </p:cSld>
+  <p:clrMap bg1="lt1" tx1="dk1" bg2="lt2" tx2="dk2" accent1="accent1" accent2="accent2" accent3="accent3" accent4="accent4" accent5="accent5" accent6="accent6" hlink="hlink" folHlink="folHlink"/>
+  <p:notesStyle>
+    <a:lvl1pPr marL="0" algn="l" defTabSz="914400" rtl="0" eaLnBrk="1" latinLnBrk="0" hangingPunct="1">
+      <a:defRPr sz="1200" kern="1200">
+        <a:solidFill>
+          <a:schemeClr val="tx1"/>
+        </a:solidFill>
+        <a:latin typeface="+mn-lt"/>
+        <a:ea typeface="+mn-ea"/>
+        <a:cs typeface="+mn-cs"/>
+      </a:defRPr>
+    </a:lvl1pPr>
+    <a:lvl2pPr marL="457200" algn="l" defTabSz="914400" rtl="0" eaLnBrk="1" latinLnBrk="0" hangingPunct="1">
+      <a:defRPr sz="1200" kern="1200">
+        <a:solidFill>
+          <a:schemeClr val="tx1"/>
+        </a:solidFill>
+        <a:latin typeface="+mn-lt"/>
+        <a:ea typeface="+mn-ea"/>
+        <a:cs typeface="+mn-cs"/>
+      </a:defRPr>
+    </a:lvl2pPr>
+    <a:lvl3pPr marL="914400" algn="l" defTabSz="914400" rtl="0" eaLnBrk="1" latinLnBrk="0" hangingPunct="1">
+      <a:defRPr sz="1200" kern="1200">
+        <a:solidFill>
+          <a:schemeClr val="tx1"/>
+        </a:solidFill>
+        <a:latin typeface="+mn-lt"/>
+        <a:ea typeface="+mn-ea"/>
+        <a:cs typeface="+mn-cs"/>
+      </a:defRPr>
+    </a:lvl3pPr>
+    <a:lvl4pPr marL="1371600" algn="l" defTabSz="914400" rtl="0" eaLnBrk="1" latinLnBrk="0" hangingPunct="1">
+      <a:defRPr sz="1200" kern="1200">
+        <a:solidFill>
+          <a:schemeClr val="tx1"/>
+        </a:solidFill>
+        <a:latin typeface="+mn-lt"/>
+        <a:ea typeface="+mn-ea"/>
+        <a:cs typeface="+mn-cs"/>
+      </a:defRPr>
+    </a:lvl4pPr>
+    <a:lvl5pPr marL="1828800" algn="l" defTabSz="914400" rtl="0" eaLnBrk="1" latinLnBrk="0" hangingPunct="1">
+      <a:defRPr sz="1200" kern="1200">
+        <a:solidFill>
+          <a:schemeClr val="tx1"/>
+        </a:solidFill>
+        <a:latin typeface="+mn-lt"/>
+        <a:ea typeface="+mn-ea"/>
+        <a:cs typeface="+mn-cs"/>
+      </a:defRPr>
+    </a:lvl5pPr>
+    <a:lvl6pPr marL="2286000" algn="l" defTabSz="914400" rtl="0" eaLnBrk="1" latinLnBrk="0" hangingPunct="1">
+      <a:defRPr sz="1200" kern="1200">
+        <a:solidFill>
+          <a:schemeClr val="tx1"/>
+        </a:solidFill>
+        <a:latin typeface="+mn-lt"/>
+        <a:ea typeface="+mn-ea"/>
+        <a:cs typeface="+mn-cs"/>
+      </a:defRPr>
+    </a:lvl6pPr>
+    <a:lvl7pPr marL="2743200" algn="l" defTabSz="914400" rtl="0" eaLnBrk="1" latinLnBrk="0" hangingPunct="1">
+      <a:defRPr sz="1200" kern="1200">
+        <a:solidFill>
+          <a:schemeClr val="tx1"/>
+        </a:solidFill>
+        <a:latin typeface="+mn-lt"/>
+        <a:ea typeface="+mn-ea"/>
+        <a:cs typeface="+mn-cs"/>
+      </a:defRPr>
+    </a:lvl7pPr>
+    <a:lvl8pPr marL="3200400" algn="l" defTabSz="914400" rtl="0" eaLnBrk="1" latinLnBrk="0" hangingPunct="1">
+      <a:defRPr sz="1200" kern="1200">
+        <a:solidFill>
+          <a:schemeClr val="tx1"/>
+        </a:solidFill>
+        <a:latin typeface="+mn-lt"/>
+        <a:ea typeface="+mn-ea"/>
+        <a:cs typeface="+mn-cs"/>
+      </a:defRPr>
+    </a:lvl8pPr>
+    <a:lvl9pPr marL="3657600" algn="l" defTabSz="914400" rtl="0" eaLnBrk="1" latinLnBrk="0" hangingPunct="1">
+      <a:defRPr sz="1200" kern="1200">
+        <a:solidFill>
+          <a:schemeClr val="tx1"/>
+        </a:solidFill>
+        <a:latin typeface="+mn-lt"/>
+        <a:ea typeface="+mn-ea"/>
+        <a:cs typeface="+mn-cs"/>
+      </a:defRPr>
+    </a:lvl9pPr>
+  </p:notesStyle>
+</p:notesMaster>
+</file>
+
+<file path=ppt/notesSlides/notesSlide1.xml><?xml version="1.0" encoding="utf-8"?>
+<p:notes xmlns:a="http://schemas.openxmlformats.org/drawingml/2006/main" xmlns:r="http://schemas.openxmlformats.org/officeDocument/2006/relationships" xmlns:p="http://schemas.openxmlformats.org/presentationml/2006/main">
+  <p:cSld>
+    <p:spTree>
+      <p:nvGrpSpPr>
+        <p:cNvPr id="1" name=""/>
+        <p:cNvGrpSpPr/>
+        <p:nvPr/>
+      </p:nvGrpSpPr>
+      <p:grpSpPr>
+        <a:xfrm>
+          <a:off x="0" y="0"/>
+          <a:ext cx="0" cy="0"/>
+          <a:chOff x="0" y="0"/>
+          <a:chExt cx="0" cy="0"/>
+        </a:xfrm>
+      </p:grpSpPr>
+      <p:sp>
+        <p:nvSpPr>
+          <p:cNvPr id="2" name="Slide Image Placeholder 1"/>
+          <p:cNvSpPr>
+            <a:spLocks noGrp="1" noRot="1" noChangeAspect="1"/>
+          </p:cNvSpPr>
+          <p:nvPr>
+            <p:ph type="sldImg"/>
+          </p:nvPr>
+        </p:nvSpPr>
+        <p:spPr/>
+      </p:sp>
+      <p:sp>
+        <p:nvSpPr>
+          <p:cNvPr id="3" name="Notes Placeholder 2"/>
+          <p:cNvSpPr>
+            <a:spLocks noGrp="1"/>
+          </p:cNvSpPr>
+          <p:nvPr>
+            <p:ph type="body" idx="1"/>
+          </p:nvPr>
+        </p:nvSpPr>
+        <p:spPr/>
+        <p:txBody>
+          <a:bodyPr/>
+          <a:lstStyle/>
+          <a:p>
+            <a:endParaRPr lang="en-GB" dirty="0"/>
+          </a:p>
+        </p:txBody>
+      </p:sp>
+      <p:sp>
+        <p:nvSpPr>
+          <p:cNvPr id="4" name="Slide Number Placeholder 3"/>
+          <p:cNvSpPr>
+            <a:spLocks noGrp="1"/>
+          </p:cNvSpPr>
+          <p:nvPr>
+            <p:ph type="sldNum" sz="quarter" idx="5"/>
+          </p:nvPr>
+        </p:nvSpPr>
+        <p:spPr/>
+        <p:txBody>
+          <a:bodyPr/>
+          <a:lstStyle/>
+          <a:p>
+            <a:fld id="{7F2FAC71-0F1C-504C-A0F9-DE820AC8FBFB}" type="slidenum">
+              <a:rPr lang="en-GB" smtClean="0"/>
+              <a:t>11</a:t>
+            </a:fld>
+            <a:endParaRPr lang="en-GB"/>
+          </a:p>
+        </p:txBody>
+      </p:sp>
+    </p:spTree>
+    <p:extLst>
+      <p:ext uri="{BB962C8B-B14F-4D97-AF65-F5344CB8AC3E}">
+        <p14:creationId xmlns:p14="http://schemas.microsoft.com/office/powerpoint/2010/main" val="1474148189"/>
+      </p:ext>
+    </p:extLst>
+  </p:cSld>
+  <p:clrMapOvr>
+    <a:masterClrMapping/>
+  </p:clrMapOvr>
+</p:notes>
 </file>
 
 <file path=ppt/slideLayouts/slideLayout1.xml><?xml version="1.0" encoding="utf-8"?>
@@ -3322,6 +3776,517 @@
           <a:chExt cx="0" cy="0"/>
         </a:xfrm>
       </p:grpSpPr>
+      <p:sp>
+        <p:nvSpPr>
+          <p:cNvPr id="2" name="Title 1">
+            <a:extLst>
+              <a:ext uri="{FF2B5EF4-FFF2-40B4-BE49-F238E27FC236}">
+                <a16:creationId xmlns:a16="http://schemas.microsoft.com/office/drawing/2014/main" id="{17931C8F-DA69-A1F3-20B8-55394D3D932F}"/>
+              </a:ext>
+            </a:extLst>
+          </p:cNvPr>
+          <p:cNvSpPr>
+            <a:spLocks noGrp="1"/>
+          </p:cNvSpPr>
+          <p:nvPr>
+            <p:ph type="title"/>
+          </p:nvPr>
+        </p:nvSpPr>
+        <p:spPr/>
+        <p:txBody>
+          <a:bodyPr/>
+          <a:lstStyle/>
+          <a:p>
+            <a:r>
+              <a:rPr lang="en-GB" dirty="0"/>
+              <a:t>Import</a:t>
+            </a:r>
+          </a:p>
+        </p:txBody>
+      </p:sp>
+      <p:sp>
+        <p:nvSpPr>
+          <p:cNvPr id="4" name="Content Placeholder 3">
+            <a:extLst>
+              <a:ext uri="{FF2B5EF4-FFF2-40B4-BE49-F238E27FC236}">
+                <a16:creationId xmlns:a16="http://schemas.microsoft.com/office/drawing/2014/main" id="{8DB7FA0F-8BA1-A388-860A-62101854E285}"/>
+              </a:ext>
+            </a:extLst>
+          </p:cNvPr>
+          <p:cNvSpPr>
+            <a:spLocks noGrp="1"/>
+          </p:cNvSpPr>
+          <p:nvPr>
+            <p:ph idx="1"/>
+          </p:nvPr>
+        </p:nvSpPr>
+        <p:spPr/>
+        <p:txBody>
+          <a:bodyPr/>
+          <a:lstStyle/>
+          <a:p>
+            <a:endParaRPr lang="en-GB"/>
+          </a:p>
+        </p:txBody>
+      </p:sp>
+    </p:spTree>
+    <p:extLst>
+      <p:ext uri="{BB962C8B-B14F-4D97-AF65-F5344CB8AC3E}">
+        <p14:creationId xmlns:p14="http://schemas.microsoft.com/office/powerpoint/2010/main" val="2699949449"/>
+      </p:ext>
+    </p:extLst>
+  </p:cSld>
+  <p:clrMapOvr>
+    <a:masterClrMapping/>
+  </p:clrMapOvr>
+</p:sld>
+</file>
+
+<file path=ppt/slides/slide10.xml><?xml version="1.0" encoding="utf-8"?>
+<p:sld xmlns:a="http://schemas.openxmlformats.org/drawingml/2006/main" xmlns:r="http://schemas.openxmlformats.org/officeDocument/2006/relationships" xmlns:p="http://schemas.openxmlformats.org/presentationml/2006/main">
+  <p:cSld>
+    <p:spTree>
+      <p:nvGrpSpPr>
+        <p:cNvPr id="1" name=""/>
+        <p:cNvGrpSpPr/>
+        <p:nvPr/>
+      </p:nvGrpSpPr>
+      <p:grpSpPr>
+        <a:xfrm>
+          <a:off x="0" y="0"/>
+          <a:ext cx="0" cy="0"/>
+          <a:chOff x="0" y="0"/>
+          <a:chExt cx="0" cy="0"/>
+        </a:xfrm>
+      </p:grpSpPr>
+      <p:pic>
+        <p:nvPicPr>
+          <p:cNvPr id="2" name="Picture 1" descr="A screenshot of a computer&#10;&#10;Description automatically generated">
+            <a:extLst>
+              <a:ext uri="{FF2B5EF4-FFF2-40B4-BE49-F238E27FC236}">
+                <a16:creationId xmlns:a16="http://schemas.microsoft.com/office/drawing/2014/main" id="{A776DB7C-88F6-6A34-A3CA-12C0C3242D92}"/>
+              </a:ext>
+            </a:extLst>
+          </p:cNvPr>
+          <p:cNvPicPr>
+            <a:picLocks noChangeAspect="1"/>
+          </p:cNvPicPr>
+          <p:nvPr/>
+        </p:nvPicPr>
+        <p:blipFill>
+          <a:blip r:embed="rId2"/>
+          <a:srcRect r="57647" b="43111"/>
+          <a:stretch/>
+        </p:blipFill>
+        <p:spPr>
+          <a:xfrm>
+            <a:off x="704088" y="957885"/>
+            <a:ext cx="7808976" cy="5900115"/>
+          </a:xfrm>
+          <a:prstGeom prst="rect">
+            <a:avLst/>
+          </a:prstGeom>
+        </p:spPr>
+      </p:pic>
+    </p:spTree>
+    <p:extLst>
+      <p:ext uri="{BB962C8B-B14F-4D97-AF65-F5344CB8AC3E}">
+        <p14:creationId xmlns:p14="http://schemas.microsoft.com/office/powerpoint/2010/main" val="2192768045"/>
+      </p:ext>
+    </p:extLst>
+  </p:cSld>
+  <p:clrMapOvr>
+    <a:masterClrMapping/>
+  </p:clrMapOvr>
+</p:sld>
+</file>
+
+<file path=ppt/slides/slide11.xml><?xml version="1.0" encoding="utf-8"?>
+<p:sld xmlns:a="http://schemas.openxmlformats.org/drawingml/2006/main" xmlns:r="http://schemas.openxmlformats.org/officeDocument/2006/relationships" xmlns:p="http://schemas.openxmlformats.org/presentationml/2006/main">
+  <p:cSld>
+    <p:spTree>
+      <p:nvGrpSpPr>
+        <p:cNvPr id="1" name=""/>
+        <p:cNvGrpSpPr/>
+        <p:nvPr/>
+      </p:nvGrpSpPr>
+      <p:grpSpPr>
+        <a:xfrm>
+          <a:off x="0" y="0"/>
+          <a:ext cx="0" cy="0"/>
+          <a:chOff x="0" y="0"/>
+          <a:chExt cx="0" cy="0"/>
+        </a:xfrm>
+      </p:grpSpPr>
+      <p:pic>
+        <p:nvPicPr>
+          <p:cNvPr id="4" name="Picture 3" descr="A screenshot of a computer&#10;&#10;Description automatically generated">
+            <a:extLst>
+              <a:ext uri="{FF2B5EF4-FFF2-40B4-BE49-F238E27FC236}">
+                <a16:creationId xmlns:a16="http://schemas.microsoft.com/office/drawing/2014/main" id="{FA7F4EF9-13D9-13B6-6572-66E9ABE801E3}"/>
+              </a:ext>
+            </a:extLst>
+          </p:cNvPr>
+          <p:cNvPicPr>
+            <a:picLocks noChangeAspect="1"/>
+          </p:cNvPicPr>
+          <p:nvPr/>
+        </p:nvPicPr>
+        <p:blipFill>
+          <a:blip r:embed="rId3"/>
+          <a:srcRect r="55294" b="58170"/>
+          <a:stretch/>
+        </p:blipFill>
+        <p:spPr>
+          <a:xfrm>
+            <a:off x="1283207" y="786384"/>
+            <a:ext cx="8778241" cy="4620124"/>
+          </a:xfrm>
+          <a:prstGeom prst="rect">
+            <a:avLst/>
+          </a:prstGeom>
+        </p:spPr>
+      </p:pic>
+    </p:spTree>
+    <p:extLst>
+      <p:ext uri="{BB962C8B-B14F-4D97-AF65-F5344CB8AC3E}">
+        <p14:creationId xmlns:p14="http://schemas.microsoft.com/office/powerpoint/2010/main" val="2399039893"/>
+      </p:ext>
+    </p:extLst>
+  </p:cSld>
+  <p:clrMapOvr>
+    <a:masterClrMapping/>
+  </p:clrMapOvr>
+</p:sld>
+</file>
+
+<file path=ppt/slides/slide12.xml><?xml version="1.0" encoding="utf-8"?>
+<p:sld xmlns:a="http://schemas.openxmlformats.org/drawingml/2006/main" xmlns:r="http://schemas.openxmlformats.org/officeDocument/2006/relationships" xmlns:p="http://schemas.openxmlformats.org/presentationml/2006/main">
+  <p:cSld>
+    <p:spTree>
+      <p:nvGrpSpPr>
+        <p:cNvPr id="1" name=""/>
+        <p:cNvGrpSpPr/>
+        <p:nvPr/>
+      </p:nvGrpSpPr>
+      <p:grpSpPr>
+        <a:xfrm>
+          <a:off x="0" y="0"/>
+          <a:ext cx="0" cy="0"/>
+          <a:chOff x="0" y="0"/>
+          <a:chExt cx="0" cy="0"/>
+        </a:xfrm>
+      </p:grpSpPr>
+      <p:pic>
+        <p:nvPicPr>
+          <p:cNvPr id="2" name="Picture 1" descr="A screenshot of a computer&#10;&#10;Description automatically generated">
+            <a:extLst>
+              <a:ext uri="{FF2B5EF4-FFF2-40B4-BE49-F238E27FC236}">
+                <a16:creationId xmlns:a16="http://schemas.microsoft.com/office/drawing/2014/main" id="{E5785576-1623-E05A-C7C2-3592783CE56D}"/>
+              </a:ext>
+            </a:extLst>
+          </p:cNvPr>
+          <p:cNvPicPr>
+            <a:picLocks noChangeAspect="1"/>
+          </p:cNvPicPr>
+          <p:nvPr/>
+        </p:nvPicPr>
+        <p:blipFill>
+          <a:blip r:embed="rId2"/>
+          <a:srcRect t="-1" r="54459" b="43516"/>
+          <a:stretch/>
+        </p:blipFill>
+        <p:spPr>
+          <a:xfrm>
+            <a:off x="712317" y="557211"/>
+            <a:ext cx="7142379" cy="4982923"/>
+          </a:xfrm>
+          <a:prstGeom prst="rect">
+            <a:avLst/>
+          </a:prstGeom>
+        </p:spPr>
+      </p:pic>
+    </p:spTree>
+    <p:extLst>
+      <p:ext uri="{BB962C8B-B14F-4D97-AF65-F5344CB8AC3E}">
+        <p14:creationId xmlns:p14="http://schemas.microsoft.com/office/powerpoint/2010/main" val="1203670698"/>
+      </p:ext>
+    </p:extLst>
+  </p:cSld>
+  <p:clrMapOvr>
+    <a:masterClrMapping/>
+  </p:clrMapOvr>
+</p:sld>
+</file>
+
+<file path=ppt/slides/slide13.xml><?xml version="1.0" encoding="utf-8"?>
+<p:sld xmlns:a="http://schemas.openxmlformats.org/drawingml/2006/main" xmlns:r="http://schemas.openxmlformats.org/officeDocument/2006/relationships" xmlns:p="http://schemas.openxmlformats.org/presentationml/2006/main">
+  <p:cSld>
+    <p:spTree>
+      <p:nvGrpSpPr>
+        <p:cNvPr id="1" name=""/>
+        <p:cNvGrpSpPr/>
+        <p:nvPr/>
+      </p:nvGrpSpPr>
+      <p:grpSpPr>
+        <a:xfrm>
+          <a:off x="0" y="0"/>
+          <a:ext cx="0" cy="0"/>
+          <a:chOff x="0" y="0"/>
+          <a:chExt cx="0" cy="0"/>
+        </a:xfrm>
+      </p:grpSpPr>
+      <p:pic>
+        <p:nvPicPr>
+          <p:cNvPr id="3" name="Picture 2" descr="A screenshot of a computer&#10;&#10;Description automatically generated">
+            <a:extLst>
+              <a:ext uri="{FF2B5EF4-FFF2-40B4-BE49-F238E27FC236}">
+                <a16:creationId xmlns:a16="http://schemas.microsoft.com/office/drawing/2014/main" id="{5D87B530-9BA2-20D7-F825-6771A1DF33DF}"/>
+              </a:ext>
+            </a:extLst>
+          </p:cNvPr>
+          <p:cNvPicPr>
+            <a:picLocks noChangeAspect="1"/>
+          </p:cNvPicPr>
+          <p:nvPr/>
+        </p:nvPicPr>
+        <p:blipFill>
+          <a:blip r:embed="rId2"/>
+          <a:srcRect r="55529" b="39346"/>
+          <a:stretch/>
+        </p:blipFill>
+        <p:spPr>
+          <a:xfrm>
+            <a:off x="1490472" y="640080"/>
+            <a:ext cx="6446520" cy="4945742"/>
+          </a:xfrm>
+          <a:prstGeom prst="rect">
+            <a:avLst/>
+          </a:prstGeom>
+        </p:spPr>
+      </p:pic>
+    </p:spTree>
+    <p:extLst>
+      <p:ext uri="{BB962C8B-B14F-4D97-AF65-F5344CB8AC3E}">
+        <p14:creationId xmlns:p14="http://schemas.microsoft.com/office/powerpoint/2010/main" val="643788885"/>
+      </p:ext>
+    </p:extLst>
+  </p:cSld>
+  <p:clrMapOvr>
+    <a:masterClrMapping/>
+  </p:clrMapOvr>
+</p:sld>
+</file>
+
+<file path=ppt/slides/slide14.xml><?xml version="1.0" encoding="utf-8"?>
+<p:sld xmlns:a="http://schemas.openxmlformats.org/drawingml/2006/main" xmlns:r="http://schemas.openxmlformats.org/officeDocument/2006/relationships" xmlns:p="http://schemas.openxmlformats.org/presentationml/2006/main">
+  <p:cSld>
+    <p:spTree>
+      <p:nvGrpSpPr>
+        <p:cNvPr id="1" name=""/>
+        <p:cNvGrpSpPr/>
+        <p:nvPr/>
+      </p:nvGrpSpPr>
+      <p:grpSpPr>
+        <a:xfrm>
+          <a:off x="0" y="0"/>
+          <a:ext cx="0" cy="0"/>
+          <a:chOff x="0" y="0"/>
+          <a:chExt cx="0" cy="0"/>
+        </a:xfrm>
+      </p:grpSpPr>
+      <p:grpSp>
+        <p:nvGrpSpPr>
+          <p:cNvPr id="2" name="Group 1">
+            <a:extLst>
+              <a:ext uri="{FF2B5EF4-FFF2-40B4-BE49-F238E27FC236}">
+                <a16:creationId xmlns:a16="http://schemas.microsoft.com/office/drawing/2014/main" id="{E2B49566-CE6D-20FF-57C5-9A585CE29379}"/>
+              </a:ext>
+            </a:extLst>
+          </p:cNvPr>
+          <p:cNvGrpSpPr/>
+          <p:nvPr/>
+        </p:nvGrpSpPr>
+        <p:grpSpPr>
+          <a:xfrm>
+            <a:off x="1984952" y="868679"/>
+            <a:ext cx="5860600" cy="4564821"/>
+            <a:chOff x="6154616" y="1789935"/>
+            <a:chExt cx="4061913" cy="3163824"/>
+          </a:xfrm>
+        </p:grpSpPr>
+        <p:pic>
+          <p:nvPicPr>
+            <p:cNvPr id="3" name="Picture 2" descr="A screenshot of a computer&#10;&#10;Description automatically generated">
+              <a:extLst>
+                <a:ext uri="{FF2B5EF4-FFF2-40B4-BE49-F238E27FC236}">
+                  <a16:creationId xmlns:a16="http://schemas.microsoft.com/office/drawing/2014/main" id="{77B0D1BA-654F-6B85-F0F5-615E0C3EE301}"/>
+                </a:ext>
+              </a:extLst>
+            </p:cNvPr>
+            <p:cNvPicPr>
+              <a:picLocks noChangeAspect="1"/>
+            </p:cNvPicPr>
+            <p:nvPr/>
+          </p:nvPicPr>
+          <p:blipFill>
+            <a:blip r:embed="rId2"/>
+            <a:srcRect t="1" r="77245" b="41996"/>
+            <a:stretch/>
+          </p:blipFill>
+          <p:spPr>
+            <a:xfrm>
+              <a:off x="8086663" y="1792398"/>
+              <a:ext cx="2129866" cy="3053921"/>
+            </a:xfrm>
+            <a:prstGeom prst="rect">
+              <a:avLst/>
+            </a:prstGeom>
+          </p:spPr>
+        </p:pic>
+        <p:pic>
+          <p:nvPicPr>
+            <p:cNvPr id="4" name="Picture 3" descr="A screenshot of a computer&#10;&#10;Description automatically generated">
+              <a:extLst>
+                <a:ext uri="{FF2B5EF4-FFF2-40B4-BE49-F238E27FC236}">
+                  <a16:creationId xmlns:a16="http://schemas.microsoft.com/office/drawing/2014/main" id="{A2B29629-E9D4-6E3F-3E46-C5F7C5104C57}"/>
+                </a:ext>
+              </a:extLst>
+            </p:cNvPr>
+            <p:cNvPicPr>
+              <a:picLocks noChangeAspect="1"/>
+            </p:cNvPicPr>
+            <p:nvPr/>
+          </p:nvPicPr>
+          <p:blipFill>
+            <a:blip r:embed="rId3"/>
+            <a:srcRect r="75875" b="27634"/>
+            <a:stretch/>
+          </p:blipFill>
+          <p:spPr>
+            <a:xfrm>
+              <a:off x="6154616" y="1789935"/>
+              <a:ext cx="1875080" cy="3163824"/>
+            </a:xfrm>
+            <a:prstGeom prst="rect">
+              <a:avLst/>
+            </a:prstGeom>
+          </p:spPr>
+        </p:pic>
+      </p:grpSp>
+    </p:spTree>
+    <p:extLst>
+      <p:ext uri="{BB962C8B-B14F-4D97-AF65-F5344CB8AC3E}">
+        <p14:creationId xmlns:p14="http://schemas.microsoft.com/office/powerpoint/2010/main" val="54655604"/>
+      </p:ext>
+    </p:extLst>
+  </p:cSld>
+  <p:clrMapOvr>
+    <a:masterClrMapping/>
+  </p:clrMapOvr>
+</p:sld>
+</file>
+
+<file path=ppt/slides/slide15.xml><?xml version="1.0" encoding="utf-8"?>
+<p:sld xmlns:a="http://schemas.openxmlformats.org/drawingml/2006/main" xmlns:r="http://schemas.openxmlformats.org/officeDocument/2006/relationships" xmlns:p="http://schemas.openxmlformats.org/presentationml/2006/main">
+  <p:cSld>
+    <p:spTree>
+      <p:nvGrpSpPr>
+        <p:cNvPr id="1" name=""/>
+        <p:cNvGrpSpPr/>
+        <p:nvPr/>
+      </p:nvGrpSpPr>
+      <p:grpSpPr>
+        <a:xfrm>
+          <a:off x="0" y="0"/>
+          <a:ext cx="0" cy="0"/>
+          <a:chOff x="0" y="0"/>
+          <a:chExt cx="0" cy="0"/>
+        </a:xfrm>
+      </p:grpSpPr>
+      <p:sp>
+        <p:nvSpPr>
+          <p:cNvPr id="2" name="Title 1">
+            <a:extLst>
+              <a:ext uri="{FF2B5EF4-FFF2-40B4-BE49-F238E27FC236}">
+                <a16:creationId xmlns:a16="http://schemas.microsoft.com/office/drawing/2014/main" id="{7CDD9B64-ACA8-2E3B-8965-BED4A07FDDB5}"/>
+              </a:ext>
+            </a:extLst>
+          </p:cNvPr>
+          <p:cNvSpPr>
+            <a:spLocks noGrp="1"/>
+          </p:cNvSpPr>
+          <p:nvPr>
+            <p:ph type="ctrTitle"/>
+          </p:nvPr>
+        </p:nvSpPr>
+        <p:spPr/>
+        <p:txBody>
+          <a:bodyPr/>
+          <a:lstStyle/>
+          <a:p>
+            <a:r>
+              <a:rPr lang="en-GB" dirty="0"/>
+              <a:t>Visualise</a:t>
+            </a:r>
+          </a:p>
+        </p:txBody>
+      </p:sp>
+      <p:sp>
+        <p:nvSpPr>
+          <p:cNvPr id="3" name="Subtitle 2">
+            <a:extLst>
+              <a:ext uri="{FF2B5EF4-FFF2-40B4-BE49-F238E27FC236}">
+                <a16:creationId xmlns:a16="http://schemas.microsoft.com/office/drawing/2014/main" id="{9377E587-B40A-6A67-2451-4B86CEFDF665}"/>
+              </a:ext>
+            </a:extLst>
+          </p:cNvPr>
+          <p:cNvSpPr>
+            <a:spLocks noGrp="1"/>
+          </p:cNvSpPr>
+          <p:nvPr>
+            <p:ph type="subTitle" idx="1"/>
+          </p:nvPr>
+        </p:nvSpPr>
+        <p:spPr/>
+        <p:txBody>
+          <a:bodyPr/>
+          <a:lstStyle/>
+          <a:p>
+            <a:endParaRPr lang="en-GB"/>
+          </a:p>
+        </p:txBody>
+      </p:sp>
+    </p:spTree>
+    <p:extLst>
+      <p:ext uri="{BB962C8B-B14F-4D97-AF65-F5344CB8AC3E}">
+        <p14:creationId xmlns:p14="http://schemas.microsoft.com/office/powerpoint/2010/main" val="62325951"/>
+      </p:ext>
+    </p:extLst>
+  </p:cSld>
+  <p:clrMapOvr>
+    <a:masterClrMapping/>
+  </p:clrMapOvr>
+</p:sld>
+</file>
+
+<file path=ppt/slides/slide2.xml><?xml version="1.0" encoding="utf-8"?>
+<p:sld xmlns:a="http://schemas.openxmlformats.org/drawingml/2006/main" xmlns:r="http://schemas.openxmlformats.org/officeDocument/2006/relationships" xmlns:p="http://schemas.openxmlformats.org/presentationml/2006/main">
+  <p:cSld>
+    <p:spTree>
+      <p:nvGrpSpPr>
+        <p:cNvPr id="1" name=""/>
+        <p:cNvGrpSpPr/>
+        <p:nvPr/>
+      </p:nvGrpSpPr>
+      <p:grpSpPr>
+        <a:xfrm>
+          <a:off x="0" y="0"/>
+          <a:ext cx="0" cy="0"/>
+          <a:chOff x="0" y="0"/>
+          <a:chExt cx="0" cy="0"/>
+        </a:xfrm>
+      </p:grpSpPr>
       <p:pic>
         <p:nvPicPr>
           <p:cNvPr id="4" name="Picture 3" descr="A screenshot of a computer&#10;&#10;Description automatically generated">
@@ -3446,7 +4411,7 @@
 </p:sld>
 </file>
 
-<file path=ppt/slides/slide2.xml><?xml version="1.0" encoding="utf-8"?>
+<file path=ppt/slides/slide3.xml><?xml version="1.0" encoding="utf-8"?>
 <p:sld xmlns:a="http://schemas.openxmlformats.org/drawingml/2006/main" xmlns:r="http://schemas.openxmlformats.org/officeDocument/2006/relationships" xmlns:p="http://schemas.openxmlformats.org/presentationml/2006/main">
   <p:cSld>
     <p:spTree>
@@ -3469,82 +4434,6 @@
           <a:chExt cx="0" cy="0"/>
         </a:xfrm>
       </p:grpSpPr>
-      <p:sp>
-        <p:nvSpPr>
-          <p:cNvPr id="5" name="Rectangle 4">
-            <a:extLst>
-              <a:ext uri="{FF2B5EF4-FFF2-40B4-BE49-F238E27FC236}">
-                <a16:creationId xmlns:a16="http://schemas.microsoft.com/office/drawing/2014/main" id="{CB8346F0-7A7D-46AC-07DE-21A22E765BD1}"/>
-              </a:ext>
-            </a:extLst>
-          </p:cNvPr>
-          <p:cNvSpPr/>
-          <p:nvPr/>
-        </p:nvSpPr>
-        <p:spPr>
-          <a:xfrm>
-            <a:off x="2313432" y="1728216"/>
-            <a:ext cx="228600" cy="210312"/>
-          </a:xfrm>
-          <a:prstGeom prst="rect">
-            <a:avLst/>
-          </a:prstGeom>
-          <a:noFill/>
-          <a:ln/>
-        </p:spPr>
-        <p:style>
-          <a:lnRef idx="2">
-            <a:schemeClr val="accent5"/>
-          </a:lnRef>
-          <a:fillRef idx="1">
-            <a:schemeClr val="lt1"/>
-          </a:fillRef>
-          <a:effectRef idx="0">
-            <a:schemeClr val="accent5"/>
-          </a:effectRef>
-          <a:fontRef idx="minor">
-            <a:schemeClr val="dk1"/>
-          </a:fontRef>
-        </p:style>
-        <p:txBody>
-          <a:bodyPr rot="0" spcFirstLastPara="1" vertOverflow="overflow" horzOverflow="overflow" vert="horz" wrap="square" lIns="54570" tIns="54570" rIns="54570" bIns="54570" numCol="1" spcCol="38100" rtlCol="0" anchor="ctr">
-            <a:spAutoFit/>
-          </a:bodyPr>
-          <a:lstStyle/>
-          <a:p>
-            <a:pPr marL="0" marR="0" indent="0" algn="l" defTabSz="584200" rtl="0" fontAlgn="auto" latinLnBrk="0" hangingPunct="0">
-              <a:lnSpc>
-                <a:spcPct val="80000"/>
-              </a:lnSpc>
-              <a:spcBef>
-                <a:spcPts val="0"/>
-              </a:spcBef>
-              <a:spcAft>
-                <a:spcPts val="0"/>
-              </a:spcAft>
-              <a:buClrTx/>
-              <a:buSzTx/>
-              <a:buFontTx/>
-              <a:buNone/>
-              <a:tabLst/>
-            </a:pPr>
-            <a:endParaRPr kumimoji="0" lang="en-GB" sz="1200" b="0" i="0" u="none" strike="noStrike" cap="none" spc="0" normalizeH="0" baseline="0">
-              <a:ln>
-                <a:noFill/>
-              </a:ln>
-              <a:solidFill>
-                <a:srgbClr val="000000"/>
-              </a:solidFill>
-              <a:effectLst/>
-              <a:uFillTx/>
-              <a:latin typeface="Source Sans Pro"/>
-              <a:ea typeface="Source Sans Pro"/>
-              <a:cs typeface="Source Sans Pro"/>
-              <a:sym typeface="Source Sans Pro"/>
-            </a:endParaRPr>
-          </a:p>
-        </p:txBody>
-      </p:sp>
       <p:pic>
         <p:nvPicPr>
           <p:cNvPr id="3" name="Picture 2" descr="A screenshot of a computer&#10;&#10;Description automatically generated">
@@ -3566,37 +4455,8 @@
         </p:blipFill>
         <p:spPr>
           <a:xfrm>
-            <a:off x="1164082" y="1206500"/>
-            <a:ext cx="3433064" cy="2768600"/>
-          </a:xfrm>
-          <a:prstGeom prst="rect">
-            <a:avLst/>
-          </a:prstGeom>
-        </p:spPr>
-      </p:pic>
-      <p:pic>
-        <p:nvPicPr>
-          <p:cNvPr id="7" name="Picture 6" descr="A screenshot of a computer&#10;&#10;Description automatically generated">
-            <a:extLst>
-              <a:ext uri="{FF2B5EF4-FFF2-40B4-BE49-F238E27FC236}">
-                <a16:creationId xmlns:a16="http://schemas.microsoft.com/office/drawing/2014/main" id="{11036B4F-65E2-1DB0-58F6-384226335837}"/>
-              </a:ext>
-            </a:extLst>
-          </p:cNvPr>
-          <p:cNvPicPr>
-            <a:picLocks noChangeAspect="1"/>
-          </p:cNvPicPr>
-          <p:nvPr/>
-        </p:nvPicPr>
-        <p:blipFill>
-          <a:blip r:embed="rId3"/>
-          <a:srcRect t="-1" r="57269" b="37278"/>
-          <a:stretch/>
-        </p:blipFill>
-        <p:spPr>
-          <a:xfrm>
-            <a:off x="6358382" y="1041401"/>
-            <a:ext cx="3351600" cy="2767303"/>
+            <a:off x="318515" y="443990"/>
+            <a:ext cx="6490697" cy="5234433"/>
           </a:xfrm>
           <a:prstGeom prst="rect">
             <a:avLst/>
@@ -3607,6 +4467,360 @@
     <p:extLst>
       <p:ext uri="{BB962C8B-B14F-4D97-AF65-F5344CB8AC3E}">
         <p14:creationId xmlns:p14="http://schemas.microsoft.com/office/powerpoint/2010/main" val="1070637287"/>
+      </p:ext>
+    </p:extLst>
+  </p:cSld>
+  <p:clrMapOvr>
+    <a:masterClrMapping/>
+  </p:clrMapOvr>
+</p:sld>
+</file>
+
+<file path=ppt/slides/slide4.xml><?xml version="1.0" encoding="utf-8"?>
+<p:sld xmlns:a="http://schemas.openxmlformats.org/drawingml/2006/main" xmlns:r="http://schemas.openxmlformats.org/officeDocument/2006/relationships" xmlns:p="http://schemas.openxmlformats.org/presentationml/2006/main">
+  <p:cSld>
+    <p:spTree>
+      <p:nvGrpSpPr>
+        <p:cNvPr id="1" name=""/>
+        <p:cNvGrpSpPr/>
+        <p:nvPr/>
+      </p:nvGrpSpPr>
+      <p:grpSpPr>
+        <a:xfrm>
+          <a:off x="0" y="0"/>
+          <a:ext cx="0" cy="0"/>
+          <a:chOff x="0" y="0"/>
+          <a:chExt cx="0" cy="0"/>
+        </a:xfrm>
+      </p:grpSpPr>
+      <p:pic>
+        <p:nvPicPr>
+          <p:cNvPr id="4" name="Picture 3" descr="A screenshot of a computer&#10;&#10;Description automatically generated">
+            <a:extLst>
+              <a:ext uri="{FF2B5EF4-FFF2-40B4-BE49-F238E27FC236}">
+                <a16:creationId xmlns:a16="http://schemas.microsoft.com/office/drawing/2014/main" id="{4B6549F1-D27F-07DA-44E8-2967EB2A923D}"/>
+              </a:ext>
+            </a:extLst>
+          </p:cNvPr>
+          <p:cNvPicPr>
+            <a:picLocks noChangeAspect="1"/>
+          </p:cNvPicPr>
+          <p:nvPr/>
+        </p:nvPicPr>
+        <p:blipFill>
+          <a:blip r:embed="rId2"/>
+          <a:srcRect t="-1" r="57269" b="37278"/>
+          <a:stretch/>
+        </p:blipFill>
+        <p:spPr>
+          <a:xfrm>
+            <a:off x="1324079" y="506249"/>
+            <a:ext cx="6153497" cy="5080735"/>
+          </a:xfrm>
+          <a:prstGeom prst="rect">
+            <a:avLst/>
+          </a:prstGeom>
+        </p:spPr>
+      </p:pic>
+    </p:spTree>
+    <p:extLst>
+      <p:ext uri="{BB962C8B-B14F-4D97-AF65-F5344CB8AC3E}">
+        <p14:creationId xmlns:p14="http://schemas.microsoft.com/office/powerpoint/2010/main" val="3365227463"/>
+      </p:ext>
+    </p:extLst>
+  </p:cSld>
+  <p:clrMapOvr>
+    <a:masterClrMapping/>
+  </p:clrMapOvr>
+</p:sld>
+</file>
+
+<file path=ppt/slides/slide5.xml><?xml version="1.0" encoding="utf-8"?>
+<p:sld xmlns:a="http://schemas.openxmlformats.org/drawingml/2006/main" xmlns:r="http://schemas.openxmlformats.org/officeDocument/2006/relationships" xmlns:p="http://schemas.openxmlformats.org/presentationml/2006/main">
+  <p:cSld>
+    <p:spTree>
+      <p:nvGrpSpPr>
+        <p:cNvPr id="1" name=""/>
+        <p:cNvGrpSpPr/>
+        <p:nvPr/>
+      </p:nvGrpSpPr>
+      <p:grpSpPr>
+        <a:xfrm>
+          <a:off x="0" y="0"/>
+          <a:ext cx="0" cy="0"/>
+          <a:chOff x="0" y="0"/>
+          <a:chExt cx="0" cy="0"/>
+        </a:xfrm>
+      </p:grpSpPr>
+      <p:pic>
+        <p:nvPicPr>
+          <p:cNvPr id="2" name="Picture 1" descr="A screenshot of a computer&#10;&#10;Description automatically generated">
+            <a:extLst>
+              <a:ext uri="{FF2B5EF4-FFF2-40B4-BE49-F238E27FC236}">
+                <a16:creationId xmlns:a16="http://schemas.microsoft.com/office/drawing/2014/main" id="{2FF836C8-936B-238C-3588-0566045442CD}"/>
+              </a:ext>
+            </a:extLst>
+          </p:cNvPr>
+          <p:cNvPicPr>
+            <a:picLocks noChangeAspect="1"/>
+          </p:cNvPicPr>
+          <p:nvPr/>
+        </p:nvPicPr>
+        <p:blipFill>
+          <a:blip r:embed="rId2"/>
+          <a:srcRect r="37255" b="21569"/>
+          <a:stretch/>
+        </p:blipFill>
+        <p:spPr>
+          <a:xfrm>
+            <a:off x="478536" y="218600"/>
+            <a:ext cx="8985504" cy="6317932"/>
+          </a:xfrm>
+          <a:prstGeom prst="rect">
+            <a:avLst/>
+          </a:prstGeom>
+        </p:spPr>
+      </p:pic>
+    </p:spTree>
+    <p:extLst>
+      <p:ext uri="{BB962C8B-B14F-4D97-AF65-F5344CB8AC3E}">
+        <p14:creationId xmlns:p14="http://schemas.microsoft.com/office/powerpoint/2010/main" val="2808723092"/>
+      </p:ext>
+    </p:extLst>
+  </p:cSld>
+  <p:clrMapOvr>
+    <a:masterClrMapping/>
+  </p:clrMapOvr>
+</p:sld>
+</file>
+
+<file path=ppt/slides/slide6.xml><?xml version="1.0" encoding="utf-8"?>
+<p:sld xmlns:a="http://schemas.openxmlformats.org/drawingml/2006/main" xmlns:r="http://schemas.openxmlformats.org/officeDocument/2006/relationships" xmlns:p="http://schemas.openxmlformats.org/presentationml/2006/main">
+  <p:cSld>
+    <p:spTree>
+      <p:nvGrpSpPr>
+        <p:cNvPr id="1" name=""/>
+        <p:cNvGrpSpPr/>
+        <p:nvPr/>
+      </p:nvGrpSpPr>
+      <p:grpSpPr>
+        <a:xfrm>
+          <a:off x="0" y="0"/>
+          <a:ext cx="0" cy="0"/>
+          <a:chOff x="0" y="0"/>
+          <a:chExt cx="0" cy="0"/>
+        </a:xfrm>
+      </p:grpSpPr>
+      <p:pic>
+        <p:nvPicPr>
+          <p:cNvPr id="2" name="Picture 1" descr="A screenshot of a computer&#10;&#10;Description automatically generated">
+            <a:extLst>
+              <a:ext uri="{FF2B5EF4-FFF2-40B4-BE49-F238E27FC236}">
+                <a16:creationId xmlns:a16="http://schemas.microsoft.com/office/drawing/2014/main" id="{D3C77381-2BEC-C638-FFBE-1E8056630F79}"/>
+              </a:ext>
+            </a:extLst>
+          </p:cNvPr>
+          <p:cNvPicPr>
+            <a:picLocks noChangeAspect="1"/>
+          </p:cNvPicPr>
+          <p:nvPr/>
+        </p:nvPicPr>
+        <p:blipFill>
+          <a:blip r:embed="rId2"/>
+          <a:srcRect r="63491" b="17176"/>
+          <a:stretch/>
+        </p:blipFill>
+        <p:spPr>
+          <a:xfrm>
+            <a:off x="947930" y="106681"/>
+            <a:ext cx="4986526" cy="6363047"/>
+          </a:xfrm>
+          <a:prstGeom prst="rect">
+            <a:avLst/>
+          </a:prstGeom>
+        </p:spPr>
+      </p:pic>
+    </p:spTree>
+    <p:extLst>
+      <p:ext uri="{BB962C8B-B14F-4D97-AF65-F5344CB8AC3E}">
+        <p14:creationId xmlns:p14="http://schemas.microsoft.com/office/powerpoint/2010/main" val="3536963135"/>
+      </p:ext>
+    </p:extLst>
+  </p:cSld>
+  <p:clrMapOvr>
+    <a:masterClrMapping/>
+  </p:clrMapOvr>
+</p:sld>
+</file>
+
+<file path=ppt/slides/slide7.xml><?xml version="1.0" encoding="utf-8"?>
+<p:sld xmlns:a="http://schemas.openxmlformats.org/drawingml/2006/main" xmlns:r="http://schemas.openxmlformats.org/officeDocument/2006/relationships" xmlns:p="http://schemas.openxmlformats.org/presentationml/2006/main">
+  <p:cSld>
+    <p:spTree>
+      <p:nvGrpSpPr>
+        <p:cNvPr id="1" name=""/>
+        <p:cNvGrpSpPr/>
+        <p:nvPr/>
+      </p:nvGrpSpPr>
+      <p:grpSpPr>
+        <a:xfrm>
+          <a:off x="0" y="0"/>
+          <a:ext cx="0" cy="0"/>
+          <a:chOff x="0" y="0"/>
+          <a:chExt cx="0" cy="0"/>
+        </a:xfrm>
+      </p:grpSpPr>
+      <p:pic>
+        <p:nvPicPr>
+          <p:cNvPr id="3" name="Picture 2" descr="A screenshot of a computer&#10;&#10;Description automatically generated">
+            <a:extLst>
+              <a:ext uri="{FF2B5EF4-FFF2-40B4-BE49-F238E27FC236}">
+                <a16:creationId xmlns:a16="http://schemas.microsoft.com/office/drawing/2014/main" id="{36574644-CC81-2690-7257-60459FF153C7}"/>
+              </a:ext>
+            </a:extLst>
+          </p:cNvPr>
+          <p:cNvPicPr>
+            <a:picLocks noChangeAspect="1"/>
+          </p:cNvPicPr>
+          <p:nvPr/>
+        </p:nvPicPr>
+        <p:blipFill>
+          <a:blip r:embed="rId2"/>
+          <a:srcRect r="60000" b="61660"/>
+          <a:stretch/>
+        </p:blipFill>
+        <p:spPr>
+          <a:xfrm>
+            <a:off x="923544" y="1097213"/>
+            <a:ext cx="6464808" cy="3327616"/>
+          </a:xfrm>
+          <a:prstGeom prst="rect">
+            <a:avLst/>
+          </a:prstGeom>
+        </p:spPr>
+      </p:pic>
+    </p:spTree>
+    <p:extLst>
+      <p:ext uri="{BB962C8B-B14F-4D97-AF65-F5344CB8AC3E}">
+        <p14:creationId xmlns:p14="http://schemas.microsoft.com/office/powerpoint/2010/main" val="4284571200"/>
+      </p:ext>
+    </p:extLst>
+  </p:cSld>
+  <p:clrMapOvr>
+    <a:masterClrMapping/>
+  </p:clrMapOvr>
+</p:sld>
+</file>
+
+<file path=ppt/slides/slide8.xml><?xml version="1.0" encoding="utf-8"?>
+<p:sld xmlns:a="http://schemas.openxmlformats.org/drawingml/2006/main" xmlns:r="http://schemas.openxmlformats.org/officeDocument/2006/relationships" xmlns:p="http://schemas.openxmlformats.org/presentationml/2006/main">
+  <p:cSld>
+    <p:spTree>
+      <p:nvGrpSpPr>
+        <p:cNvPr id="1" name=""/>
+        <p:cNvGrpSpPr/>
+        <p:nvPr/>
+      </p:nvGrpSpPr>
+      <p:grpSpPr>
+        <a:xfrm>
+          <a:off x="0" y="0"/>
+          <a:ext cx="0" cy="0"/>
+          <a:chOff x="0" y="0"/>
+          <a:chExt cx="0" cy="0"/>
+        </a:xfrm>
+      </p:grpSpPr>
+      <p:pic>
+        <p:nvPicPr>
+          <p:cNvPr id="2" name="Picture 1" descr="A screenshot of a computer&#10;&#10;Description automatically generated">
+            <a:extLst>
+              <a:ext uri="{FF2B5EF4-FFF2-40B4-BE49-F238E27FC236}">
+                <a16:creationId xmlns:a16="http://schemas.microsoft.com/office/drawing/2014/main" id="{E1BACA38-8738-B127-F2FA-B76C0262F696}"/>
+              </a:ext>
+            </a:extLst>
+          </p:cNvPr>
+          <p:cNvPicPr>
+            <a:picLocks noChangeAspect="1"/>
+          </p:cNvPicPr>
+          <p:nvPr/>
+        </p:nvPicPr>
+        <p:blipFill>
+          <a:blip r:embed="rId2"/>
+          <a:srcRect r="56235" b="40253"/>
+          <a:stretch/>
+        </p:blipFill>
+        <p:spPr>
+          <a:xfrm>
+            <a:off x="599736" y="548739"/>
+            <a:ext cx="7492704" cy="5760522"/>
+          </a:xfrm>
+          <a:prstGeom prst="rect">
+            <a:avLst/>
+          </a:prstGeom>
+        </p:spPr>
+      </p:pic>
+    </p:spTree>
+    <p:extLst>
+      <p:ext uri="{BB962C8B-B14F-4D97-AF65-F5344CB8AC3E}">
+        <p14:creationId xmlns:p14="http://schemas.microsoft.com/office/powerpoint/2010/main" val="1362014719"/>
+      </p:ext>
+    </p:extLst>
+  </p:cSld>
+  <p:clrMapOvr>
+    <a:masterClrMapping/>
+  </p:clrMapOvr>
+</p:sld>
+</file>
+
+<file path=ppt/slides/slide9.xml><?xml version="1.0" encoding="utf-8"?>
+<p:sld xmlns:a="http://schemas.openxmlformats.org/drawingml/2006/main" xmlns:r="http://schemas.openxmlformats.org/officeDocument/2006/relationships" xmlns:p="http://schemas.openxmlformats.org/presentationml/2006/main">
+  <p:cSld>
+    <p:spTree>
+      <p:nvGrpSpPr>
+        <p:cNvPr id="1" name=""/>
+        <p:cNvGrpSpPr/>
+        <p:nvPr/>
+      </p:nvGrpSpPr>
+      <p:grpSpPr>
+        <a:xfrm>
+          <a:off x="0" y="0"/>
+          <a:ext cx="0" cy="0"/>
+          <a:chOff x="0" y="0"/>
+          <a:chExt cx="0" cy="0"/>
+        </a:xfrm>
+      </p:grpSpPr>
+      <p:pic>
+        <p:nvPicPr>
+          <p:cNvPr id="3" name="Picture 2" descr="A screenshot of a computer&#10;&#10;Description automatically generated">
+            <a:extLst>
+              <a:ext uri="{FF2B5EF4-FFF2-40B4-BE49-F238E27FC236}">
+                <a16:creationId xmlns:a16="http://schemas.microsoft.com/office/drawing/2014/main" id="{7DA4D3C4-702F-D0BA-0B5A-29DE3E6F3E9C}"/>
+              </a:ext>
+            </a:extLst>
+          </p:cNvPr>
+          <p:cNvPicPr>
+            <a:picLocks noChangeAspect="1"/>
+          </p:cNvPicPr>
+          <p:nvPr/>
+        </p:nvPicPr>
+        <p:blipFill>
+          <a:blip r:embed="rId2"/>
+          <a:srcRect r="47059" b="29307"/>
+          <a:stretch/>
+        </p:blipFill>
+        <p:spPr>
+          <a:xfrm>
+            <a:off x="667512" y="813816"/>
+            <a:ext cx="7891272" cy="5927222"/>
+          </a:xfrm>
+          <a:prstGeom prst="rect">
+            <a:avLst/>
+          </a:prstGeom>
+        </p:spPr>
+      </p:pic>
+    </p:spTree>
+    <p:extLst>
+      <p:ext uri="{BB962C8B-B14F-4D97-AF65-F5344CB8AC3E}">
+        <p14:creationId xmlns:p14="http://schemas.microsoft.com/office/powerpoint/2010/main" val="1917025132"/>
       </p:ext>
     </p:extLst>
   </p:cSld>
@@ -3929,4 +5143,319 @@
     </a:ext>
   </a:extLst>
 </a:theme>
+</file>
+
+<file path=ppt/theme/theme2.xml><?xml version="1.0" encoding="utf-8"?>
+<a:theme xmlns:a="http://schemas.openxmlformats.org/drawingml/2006/main" name="Office Theme">
+  <a:themeElements>
+    <a:clrScheme name="Office">
+      <a:dk1>
+        <a:sysClr val="windowText" lastClr="000000"/>
+      </a:dk1>
+      <a:lt1>
+        <a:sysClr val="window" lastClr="FFFFFF"/>
+      </a:lt1>
+      <a:dk2>
+        <a:srgbClr val="0E2841"/>
+      </a:dk2>
+      <a:lt2>
+        <a:srgbClr val="E8E8E8"/>
+      </a:lt2>
+      <a:accent1>
+        <a:srgbClr val="156082"/>
+      </a:accent1>
+      <a:accent2>
+        <a:srgbClr val="E97132"/>
+      </a:accent2>
+      <a:accent3>
+        <a:srgbClr val="196B24"/>
+      </a:accent3>
+      <a:accent4>
+        <a:srgbClr val="0F9ED5"/>
+      </a:accent4>
+      <a:accent5>
+        <a:srgbClr val="A02B93"/>
+      </a:accent5>
+      <a:accent6>
+        <a:srgbClr val="4EA72E"/>
+      </a:accent6>
+      <a:hlink>
+        <a:srgbClr val="467886"/>
+      </a:hlink>
+      <a:folHlink>
+        <a:srgbClr val="96607D"/>
+      </a:folHlink>
+    </a:clrScheme>
+    <a:fontScheme name="Office">
+      <a:majorFont>
+        <a:latin typeface="Aptos Display" panose="02110004020202020204"/>
+        <a:ea typeface=""/>
+        <a:cs typeface=""/>
+        <a:font script="Jpan" typeface="游ゴシック Light"/>
+        <a:font script="Hang" typeface="맑은 고딕"/>
+        <a:font script="Hans" typeface="等线 Light"/>
+        <a:font script="Hant" typeface="新細明體"/>
+        <a:font script="Arab" typeface="Times New Roman"/>
+        <a:font script="Hebr" typeface="Times New Roman"/>
+        <a:font script="Thai" typeface="Angsana New"/>
+        <a:font script="Ethi" typeface="Nyala"/>
+        <a:font script="Beng" typeface="Vrinda"/>
+        <a:font script="Gujr" typeface="Shruti"/>
+        <a:font script="Khmr" typeface="MoolBoran"/>
+        <a:font script="Knda" typeface="Tunga"/>
+        <a:font script="Guru" typeface="Raavi"/>
+        <a:font script="Cans" typeface="Euphemia"/>
+        <a:font script="Cher" typeface="Plantagenet Cherokee"/>
+        <a:font script="Yiii" typeface="Microsoft Yi Baiti"/>
+        <a:font script="Tibt" typeface="Microsoft Himalaya"/>
+        <a:font script="Thaa" typeface="MV Boli"/>
+        <a:font script="Deva" typeface="Mangal"/>
+        <a:font script="Telu" typeface="Gautami"/>
+        <a:font script="Taml" typeface="Latha"/>
+        <a:font script="Syrc" typeface="Estrangelo Edessa"/>
+        <a:font script="Orya" typeface="Kalinga"/>
+        <a:font script="Mlym" typeface="Kartika"/>
+        <a:font script="Laoo" typeface="DokChampa"/>
+        <a:font script="Sinh" typeface="Iskoola Pota"/>
+        <a:font script="Mong" typeface="Mongolian Baiti"/>
+        <a:font script="Viet" typeface="Times New Roman"/>
+        <a:font script="Uigh" typeface="Microsoft Uighur"/>
+        <a:font script="Geor" typeface="Sylfaen"/>
+        <a:font script="Armn" typeface="Arial"/>
+        <a:font script="Bugi" typeface="Leelawadee UI"/>
+        <a:font script="Bopo" typeface="Microsoft JhengHei"/>
+        <a:font script="Java" typeface="Javanese Text"/>
+        <a:font script="Lisu" typeface="Segoe UI"/>
+        <a:font script="Mymr" typeface="Myanmar Text"/>
+        <a:font script="Nkoo" typeface="Ebrima"/>
+        <a:font script="Olck" typeface="Nirmala UI"/>
+        <a:font script="Osma" typeface="Ebrima"/>
+        <a:font script="Phag" typeface="Phagspa"/>
+        <a:font script="Syrn" typeface="Estrangelo Edessa"/>
+        <a:font script="Syrj" typeface="Estrangelo Edessa"/>
+        <a:font script="Syre" typeface="Estrangelo Edessa"/>
+        <a:font script="Sora" typeface="Nirmala UI"/>
+        <a:font script="Tale" typeface="Microsoft Tai Le"/>
+        <a:font script="Talu" typeface="Microsoft New Tai Lue"/>
+        <a:font script="Tfng" typeface="Ebrima"/>
+      </a:majorFont>
+      <a:minorFont>
+        <a:latin typeface="Aptos" panose="02110004020202020204"/>
+        <a:ea typeface=""/>
+        <a:cs typeface=""/>
+        <a:font script="Jpan" typeface="游ゴシック"/>
+        <a:font script="Hang" typeface="맑은 고딕"/>
+        <a:font script="Hans" typeface="等线"/>
+        <a:font script="Hant" typeface="新細明體"/>
+        <a:font script="Arab" typeface="Arial"/>
+        <a:font script="Hebr" typeface="Arial"/>
+        <a:font script="Thai" typeface="Cordia New"/>
+        <a:font script="Ethi" typeface="Nyala"/>
+        <a:font script="Beng" typeface="Vrinda"/>
+        <a:font script="Gujr" typeface="Shruti"/>
+        <a:font script="Khmr" typeface="DaunPenh"/>
+        <a:font script="Knda" typeface="Tunga"/>
+        <a:font script="Guru" typeface="Raavi"/>
+        <a:font script="Cans" typeface="Euphemia"/>
+        <a:font script="Cher" typeface="Plantagenet Cherokee"/>
+        <a:font script="Yiii" typeface="Microsoft Yi Baiti"/>
+        <a:font script="Tibt" typeface="Microsoft Himalaya"/>
+        <a:font script="Thaa" typeface="MV Boli"/>
+        <a:font script="Deva" typeface="Mangal"/>
+        <a:font script="Telu" typeface="Gautami"/>
+        <a:font script="Taml" typeface="Latha"/>
+        <a:font script="Syrc" typeface="Estrangelo Edessa"/>
+        <a:font script="Orya" typeface="Kalinga"/>
+        <a:font script="Mlym" typeface="Kartika"/>
+        <a:font script="Laoo" typeface="DokChampa"/>
+        <a:font script="Sinh" typeface="Iskoola Pota"/>
+        <a:font script="Mong" typeface="Mongolian Baiti"/>
+        <a:font script="Viet" typeface="Arial"/>
+        <a:font script="Uigh" typeface="Microsoft Uighur"/>
+        <a:font script="Geor" typeface="Sylfaen"/>
+        <a:font script="Armn" typeface="Arial"/>
+        <a:font script="Bugi" typeface="Leelawadee UI"/>
+        <a:font script="Bopo" typeface="Microsoft JhengHei"/>
+        <a:font script="Java" typeface="Javanese Text"/>
+        <a:font script="Lisu" typeface="Segoe UI"/>
+        <a:font script="Mymr" typeface="Myanmar Text"/>
+        <a:font script="Nkoo" typeface="Ebrima"/>
+        <a:font script="Olck" typeface="Nirmala UI"/>
+        <a:font script="Osma" typeface="Ebrima"/>
+        <a:font script="Phag" typeface="Phagspa"/>
+        <a:font script="Syrn" typeface="Estrangelo Edessa"/>
+        <a:font script="Syrj" typeface="Estrangelo Edessa"/>
+        <a:font script="Syre" typeface="Estrangelo Edessa"/>
+        <a:font script="Sora" typeface="Nirmala UI"/>
+        <a:font script="Tale" typeface="Microsoft Tai Le"/>
+        <a:font script="Talu" typeface="Microsoft New Tai Lue"/>
+        <a:font script="Tfng" typeface="Ebrima"/>
+      </a:minorFont>
+    </a:fontScheme>
+    <a:fmtScheme name="Office">
+      <a:fillStyleLst>
+        <a:solidFill>
+          <a:schemeClr val="phClr"/>
+        </a:solidFill>
+        <a:gradFill rotWithShape="1">
+          <a:gsLst>
+            <a:gs pos="0">
+              <a:schemeClr val="phClr">
+                <a:lumMod val="110000"/>
+                <a:satMod val="105000"/>
+                <a:tint val="67000"/>
+              </a:schemeClr>
+            </a:gs>
+            <a:gs pos="50000">
+              <a:schemeClr val="phClr">
+                <a:lumMod val="105000"/>
+                <a:satMod val="103000"/>
+                <a:tint val="73000"/>
+              </a:schemeClr>
+            </a:gs>
+            <a:gs pos="100000">
+              <a:schemeClr val="phClr">
+                <a:lumMod val="105000"/>
+                <a:satMod val="109000"/>
+                <a:tint val="81000"/>
+              </a:schemeClr>
+            </a:gs>
+          </a:gsLst>
+          <a:lin ang="5400000" scaled="0"/>
+        </a:gradFill>
+        <a:gradFill rotWithShape="1">
+          <a:gsLst>
+            <a:gs pos="0">
+              <a:schemeClr val="phClr">
+                <a:satMod val="103000"/>
+                <a:lumMod val="102000"/>
+                <a:tint val="94000"/>
+              </a:schemeClr>
+            </a:gs>
+            <a:gs pos="50000">
+              <a:schemeClr val="phClr">
+                <a:satMod val="110000"/>
+                <a:lumMod val="100000"/>
+                <a:shade val="100000"/>
+              </a:schemeClr>
+            </a:gs>
+            <a:gs pos="100000">
+              <a:schemeClr val="phClr">
+                <a:lumMod val="99000"/>
+                <a:satMod val="120000"/>
+                <a:shade val="78000"/>
+              </a:schemeClr>
+            </a:gs>
+          </a:gsLst>
+          <a:lin ang="5400000" scaled="0"/>
+        </a:gradFill>
+      </a:fillStyleLst>
+      <a:lnStyleLst>
+        <a:ln w="12700" cap="flat" cmpd="sng" algn="ctr">
+          <a:solidFill>
+            <a:schemeClr val="phClr"/>
+          </a:solidFill>
+          <a:prstDash val="solid"/>
+          <a:miter lim="800000"/>
+        </a:ln>
+        <a:ln w="19050" cap="flat" cmpd="sng" algn="ctr">
+          <a:solidFill>
+            <a:schemeClr val="phClr"/>
+          </a:solidFill>
+          <a:prstDash val="solid"/>
+          <a:miter lim="800000"/>
+        </a:ln>
+        <a:ln w="25400" cap="flat" cmpd="sng" algn="ctr">
+          <a:solidFill>
+            <a:schemeClr val="phClr"/>
+          </a:solidFill>
+          <a:prstDash val="solid"/>
+          <a:miter lim="800000"/>
+        </a:ln>
+      </a:lnStyleLst>
+      <a:effectStyleLst>
+        <a:effectStyle>
+          <a:effectLst/>
+        </a:effectStyle>
+        <a:effectStyle>
+          <a:effectLst/>
+        </a:effectStyle>
+        <a:effectStyle>
+          <a:effectLst>
+            <a:outerShdw blurRad="57150" dist="19050" dir="5400000" algn="ctr" rotWithShape="0">
+              <a:srgbClr val="000000">
+                <a:alpha val="63000"/>
+              </a:srgbClr>
+            </a:outerShdw>
+          </a:effectLst>
+        </a:effectStyle>
+      </a:effectStyleLst>
+      <a:bgFillStyleLst>
+        <a:solidFill>
+          <a:schemeClr val="phClr"/>
+        </a:solidFill>
+        <a:solidFill>
+          <a:schemeClr val="phClr">
+            <a:tint val="95000"/>
+            <a:satMod val="170000"/>
+          </a:schemeClr>
+        </a:solidFill>
+        <a:gradFill rotWithShape="1">
+          <a:gsLst>
+            <a:gs pos="0">
+              <a:schemeClr val="phClr">
+                <a:tint val="93000"/>
+                <a:satMod val="150000"/>
+                <a:shade val="98000"/>
+                <a:lumMod val="102000"/>
+              </a:schemeClr>
+            </a:gs>
+            <a:gs pos="50000">
+              <a:schemeClr val="phClr">
+                <a:tint val="98000"/>
+                <a:satMod val="130000"/>
+                <a:shade val="90000"/>
+                <a:lumMod val="103000"/>
+              </a:schemeClr>
+            </a:gs>
+            <a:gs pos="100000">
+              <a:schemeClr val="phClr">
+                <a:shade val="63000"/>
+                <a:satMod val="120000"/>
+              </a:schemeClr>
+            </a:gs>
+          </a:gsLst>
+          <a:lin ang="5400000" scaled="0"/>
+        </a:gradFill>
+      </a:bgFillStyleLst>
+    </a:fmtScheme>
+  </a:themeElements>
+  <a:objectDefaults>
+    <a:lnDef>
+      <a:spPr/>
+      <a:bodyPr/>
+      <a:lstStyle/>
+      <a:style>
+        <a:lnRef idx="2">
+          <a:schemeClr val="accent1"/>
+        </a:lnRef>
+        <a:fillRef idx="0">
+          <a:schemeClr val="accent1"/>
+        </a:fillRef>
+        <a:effectRef idx="1">
+          <a:schemeClr val="accent1"/>
+        </a:effectRef>
+        <a:fontRef idx="minor">
+          <a:schemeClr val="tx1"/>
+        </a:fontRef>
+      </a:style>
+    </a:lnDef>
+  </a:objectDefaults>
+  <a:extraClrSchemeLst/>
+  <a:extLst>
+    <a:ext uri="{05A4C25C-085E-4340-85A3-A5531E510DB2}">
+      <thm15:themeFamily xmlns:thm15="http://schemas.microsoft.com/office/thememl/2012/main" name="Office Theme" id="{2E142A2C-CD16-42D6-873A-C26D2A0506FA}" vid="{1BDDFF52-6CD6-40A5-AB3C-68EB2F1E4D0A}"/>
+    </a:ext>
+  </a:extLst>
+</a:theme>
 </file>
</xml_diff>